<commit_message>
arq comput NID 18Abr2024
</commit_message>
<xml_diff>
--- a/01 Classes/Aula01- Noções de Informática.pptx
+++ b/01 Classes/Aula01- Noções de Informática.pptx
@@ -5,7 +5,7 @@
     <p:sldMasterId id="2147483648" r:id="rId4"/>
   </p:sldMasterIdLst>
   <p:notesMasterIdLst>
-    <p:notesMasterId r:id="rId19"/>
+    <p:notesMasterId r:id="rId20"/>
   </p:notesMasterIdLst>
   <p:sldIdLst>
     <p:sldId id="256" r:id="rId5"/>
@@ -13,15 +13,16 @@
     <p:sldId id="1448944854" r:id="rId7"/>
     <p:sldId id="1448944864" r:id="rId8"/>
     <p:sldId id="1448944863" r:id="rId9"/>
-    <p:sldId id="1448944851" r:id="rId10"/>
-    <p:sldId id="1448944865" r:id="rId11"/>
-    <p:sldId id="1448944852" r:id="rId12"/>
-    <p:sldId id="1448944866" r:id="rId13"/>
-    <p:sldId id="1448944853" r:id="rId14"/>
-    <p:sldId id="1448944850" r:id="rId15"/>
-    <p:sldId id="1448944858" r:id="rId16"/>
-    <p:sldId id="1448944856" r:id="rId17"/>
-    <p:sldId id="1448944862" r:id="rId18"/>
+    <p:sldId id="1448944867" r:id="rId10"/>
+    <p:sldId id="1448944851" r:id="rId11"/>
+    <p:sldId id="1448944865" r:id="rId12"/>
+    <p:sldId id="1448944852" r:id="rId13"/>
+    <p:sldId id="1448944866" r:id="rId14"/>
+    <p:sldId id="1448944853" r:id="rId15"/>
+    <p:sldId id="1448944850" r:id="rId16"/>
+    <p:sldId id="1448944858" r:id="rId17"/>
+    <p:sldId id="1448944856" r:id="rId18"/>
+    <p:sldId id="1448944862" r:id="rId19"/>
   </p:sldIdLst>
   <p:sldSz cx="9144000" cy="5143500" type="screen16x9"/>
   <p:notesSz cx="6858000" cy="9144000"/>
@@ -3963,7 +3964,7 @@
           </a:ln>
           <a:extLst>
             <a:ext uri="{C572A759-6A51-4108-AA02-DFA0A04FC94B}">
-              <ma14:wrappingTextBoxFlag xmlns:ma14="http://schemas.microsoft.com/office/mac/drawingml/2011/main" xmlns="" val="1"/>
+              <ma14:wrappingTextBoxFlag xmlns="" xmlns:ma14="http://schemas.microsoft.com/office/mac/drawingml/2011/main" val="1"/>
             </a:ext>
           </a:extLst>
         </p:spPr>
@@ -4012,7 +4013,7 @@
           </a:ln>
           <a:extLst>
             <a:ext uri="{C572A759-6A51-4108-AA02-DFA0A04FC94B}">
-              <ma14:wrappingTextBoxFlag xmlns:ma14="http://schemas.microsoft.com/office/mac/drawingml/2011/main" xmlns="" val="1"/>
+              <ma14:wrappingTextBoxFlag xmlns="" xmlns:ma14="http://schemas.microsoft.com/office/mac/drawingml/2011/main" val="1"/>
             </a:ext>
           </a:extLst>
         </p:spPr>
@@ -4983,7 +4984,7 @@
           </a:ln>
           <a:extLst>
             <a:ext uri="{C572A759-6A51-4108-AA02-DFA0A04FC94B}">
-              <ma14:wrappingTextBoxFlag xmlns:ma14="http://schemas.microsoft.com/office/mac/drawingml/2011/main" xmlns="" val="1"/>
+              <ma14:wrappingTextBoxFlag xmlns="" xmlns:ma14="http://schemas.microsoft.com/office/mac/drawingml/2011/main" val="1"/>
             </a:ext>
           </a:extLst>
         </p:spPr>
@@ -5300,7 +5301,7 @@
           </a:ln>
           <a:extLst>
             <a:ext uri="{C572A759-6A51-4108-AA02-DFA0A04FC94B}">
-              <ma14:wrappingTextBoxFlag xmlns:ma14="http://schemas.microsoft.com/office/mac/drawingml/2011/main" xmlns="" val="1"/>
+              <ma14:wrappingTextBoxFlag xmlns="" xmlns:ma14="http://schemas.microsoft.com/office/mac/drawingml/2011/main" val="1"/>
             </a:ext>
           </a:extLst>
         </p:spPr>
@@ -5662,20 +5663,20 @@
         </p:spPr>
         <p:txBody>
           <a:bodyPr>
-            <a:normAutofit fontScale="90000"/>
+            <a:noAutofit/>
           </a:bodyPr>
           <a:lstStyle/>
           <a:p>
             <a:pPr algn="ctr"/>
             <a:r>
-              <a:rPr lang="pt-BR" dirty="0">
+              <a:rPr lang="pt-BR" sz="3200" dirty="0">
                 <a:solidFill>
                   <a:schemeClr val="bg1"/>
                 </a:solidFill>
               </a:rPr>
-              <a:t>Leitura Específica</a:t>
-            </a:r>
-            <a:endParaRPr lang="en-US" dirty="0">
+              <a:t>Pensamento Computacional</a:t>
+            </a:r>
+            <a:endParaRPr lang="en-US" sz="3200" dirty="0">
               <a:solidFill>
                 <a:schemeClr val="bg1"/>
               </a:solidFill>
@@ -5683,195 +5684,46 @@
           </a:p>
         </p:txBody>
       </p:sp>
-      <p:sp>
-        <p:nvSpPr>
-          <p:cNvPr id="3" name="CaixaDeTexto 2">
+      <p:pic>
+        <p:nvPicPr>
+          <p:cNvPr id="9" name="Imagem 8" descr="Texto branco sobre fundo preto&#10;&#10;Descrição gerada automaticamente com confiança média">
             <a:extLst>
               <a:ext uri="{FF2B5EF4-FFF2-40B4-BE49-F238E27FC236}">
-                <a16:creationId xmlns:a16="http://schemas.microsoft.com/office/drawing/2014/main" id="{376663E4-1CEE-9F31-C5DA-EFDC6BF8B1CE}"/>
+                <a16:creationId xmlns:a16="http://schemas.microsoft.com/office/drawing/2014/main" id="{44F02E65-E2B3-764A-693D-E421EF938EAC}"/>
               </a:ext>
             </a:extLst>
           </p:cNvPr>
-          <p:cNvSpPr txBox="1"/>
+          <p:cNvPicPr>
+            <a:picLocks noChangeAspect="1"/>
+          </p:cNvPicPr>
           <p:nvPr/>
-        </p:nvSpPr>
+        </p:nvPicPr>
+        <p:blipFill>
+          <a:blip r:embed="rId2">
+            <a:extLst>
+              <a:ext uri="{28A0092B-C50C-407E-A947-70E740481C1C}">
+                <a14:useLocalDpi xmlns:a14="http://schemas.microsoft.com/office/drawing/2010/main" val="0"/>
+              </a:ext>
+            </a:extLst>
+          </a:blip>
+          <a:stretch>
+            <a:fillRect/>
+          </a:stretch>
+        </p:blipFill>
         <p:spPr>
           <a:xfrm>
-            <a:off x="382903" y="1236825"/>
-            <a:ext cx="7022608" cy="3554819"/>
+            <a:off x="514859" y="1158867"/>
+            <a:ext cx="7401902" cy="3950766"/>
           </a:xfrm>
           <a:prstGeom prst="rect">
             <a:avLst/>
           </a:prstGeom>
-          <a:noFill/>
-          <a:ln w="12700" cap="flat">
-            <a:noFill/>
-            <a:miter lim="400000"/>
-          </a:ln>
-          <a:effectLst/>
-          <a:sp3d/>
         </p:spPr>
-        <p:style>
-          <a:lnRef idx="0">
-            <a:scrgbClr r="0" g="0" b="0"/>
-          </a:lnRef>
-          <a:fillRef idx="0">
-            <a:scrgbClr r="0" g="0" b="0"/>
-          </a:fillRef>
-          <a:effectRef idx="0">
-            <a:scrgbClr r="0" g="0" b="0"/>
-          </a:effectRef>
-          <a:fontRef idx="none"/>
-        </p:style>
-        <p:txBody>
-          <a:bodyPr wrap="square">
-            <a:spAutoFit/>
-          </a:bodyPr>
-          <a:lstStyle/>
-          <a:p>
-            <a:pPr marL="285750" indent="-285750">
-              <a:buFont typeface="Wingdings" panose="05000000000000000000" pitchFamily="2" charset="2"/>
-              <a:buChar char="ü"/>
-            </a:pPr>
-            <a:r>
-              <a:rPr lang="pt-BR" sz="1500" b="1" dirty="0"/>
-              <a:t>Arquitetura de Computador – </a:t>
-            </a:r>
-            <a:r>
-              <a:rPr lang="pt-BR" sz="1500" b="1" dirty="0">
-                <a:solidFill>
-                  <a:srgbClr val="FF0000"/>
-                </a:solidFill>
-              </a:rPr>
-              <a:t>Resenha junto com o aluno</a:t>
-            </a:r>
-          </a:p>
-          <a:p>
-            <a:r>
-              <a:rPr lang="pt-BR" sz="1500" b="1" dirty="0"/>
-              <a:t> 	</a:t>
-            </a:r>
-            <a:r>
-              <a:rPr lang="pt-BR" sz="1500" dirty="0">
-                <a:hlinkClick r:id="rId2"/>
-              </a:rPr>
-              <a:t>https://www.icloud.com.br/5406/o-que-e-arquitetura-e-organizacao-de-computadores</a:t>
-            </a:r>
-            <a:r>
-              <a:rPr lang="pt-BR" sz="1500" dirty="0"/>
-              <a:t> </a:t>
-            </a:r>
-          </a:p>
-          <a:p>
-            <a:r>
-              <a:rPr lang="pt-BR" sz="1500" b="1" dirty="0"/>
-              <a:t>       </a:t>
-            </a:r>
-          </a:p>
-          <a:p>
-            <a:pPr marL="285750" indent="-285750">
-              <a:buFont typeface="Wingdings" panose="05000000000000000000" pitchFamily="2" charset="2"/>
-              <a:buChar char="ü"/>
-            </a:pPr>
-            <a:r>
-              <a:rPr lang="pt-BR" sz="1500" b="1" dirty="0"/>
-              <a:t>Internet / Páginas Web – </a:t>
-            </a:r>
-            <a:r>
-              <a:rPr lang="pt-BR" sz="1500" b="1" dirty="0">
-                <a:solidFill>
-                  <a:srgbClr val="FF0000"/>
-                </a:solidFill>
-              </a:rPr>
-              <a:t>trazer um elemento para debate</a:t>
-            </a:r>
-            <a:endParaRPr lang="pt-BR" sz="1500" dirty="0">
-              <a:solidFill>
-                <a:srgbClr val="FF0000"/>
-              </a:solidFill>
-            </a:endParaRPr>
-          </a:p>
-          <a:p>
-            <a:r>
-              <a:rPr lang="pt-BR" sz="1500" dirty="0"/>
-              <a:t>	</a:t>
-            </a:r>
-            <a:r>
-              <a:rPr lang="pt-BR" sz="1500" dirty="0">
-                <a:hlinkClick r:id="rId3"/>
-              </a:rPr>
-              <a:t>https://www.w3schools.com/</a:t>
-            </a:r>
-            <a:r>
-              <a:rPr lang="pt-BR" sz="1500" dirty="0"/>
-              <a:t> </a:t>
-            </a:r>
-          </a:p>
-          <a:p>
-            <a:r>
-              <a:rPr lang="pt-BR" sz="1500" dirty="0"/>
-              <a:t>	</a:t>
-            </a:r>
-            <a:r>
-              <a:rPr lang="pt-BR" sz="1500" dirty="0">
-                <a:hlinkClick r:id="rId4"/>
-              </a:rPr>
-              <a:t>https://www.w3schools.com/html/</a:t>
-            </a:r>
-            <a:r>
-              <a:rPr lang="pt-BR" sz="1500" dirty="0"/>
-              <a:t> </a:t>
-            </a:r>
-          </a:p>
-          <a:p>
-            <a:r>
-              <a:rPr lang="pt-BR" sz="1500" dirty="0"/>
-              <a:t>	</a:t>
-            </a:r>
-            <a:r>
-              <a:rPr lang="pt-BR" sz="1500" dirty="0">
-                <a:hlinkClick r:id="rId5"/>
-              </a:rPr>
-              <a:t>https://www.devmedia.com.br/html-basico-codigos-html/16596</a:t>
-            </a:r>
-            <a:r>
-              <a:rPr lang="pt-BR" sz="1500" dirty="0"/>
-              <a:t> </a:t>
-            </a:r>
-          </a:p>
-          <a:p>
-            <a:endParaRPr lang="pt-BR" sz="1500" b="1" dirty="0"/>
-          </a:p>
-          <a:p>
-            <a:pPr marL="285750" indent="-285750">
-              <a:buFont typeface="Wingdings" panose="05000000000000000000" pitchFamily="2" charset="2"/>
-              <a:buChar char="ü"/>
-            </a:pPr>
-            <a:r>
-              <a:rPr lang="pt-BR" sz="1500" b="1" dirty="0"/>
-              <a:t>Pensamento Computacional - </a:t>
-            </a:r>
-            <a:r>
-              <a:rPr lang="pt-BR" sz="1500" b="1" dirty="0">
-                <a:solidFill>
-                  <a:srgbClr val="FF0000"/>
-                </a:solidFill>
-              </a:rPr>
-              <a:t>trazer um elemento para debate</a:t>
-            </a:r>
-          </a:p>
-          <a:p>
-            <a:r>
-              <a:rPr lang="pt-BR" sz="1500" dirty="0"/>
-              <a:t>	https://educadordofuturo.com.br/tecnologia-na-educacao/o-que-e-pensamento-computacional/#:~:text=O%20que%20%C3%A9%20pensamento%20computacional%3A%20a%20metodologia%20de%20solu%C3%A7%C3%A3o%20de%20problemas%20complexos&amp;text=O%20pensamento%20computacional%20%C3%A9%20uma,ser%20aplicada%20on%20e%20offline!</a:t>
-            </a:r>
-          </a:p>
-        </p:txBody>
-      </p:sp>
+      </p:pic>
     </p:spTree>
     <p:extLst>
       <p:ext uri="{BB962C8B-B14F-4D97-AF65-F5344CB8AC3E}">
-        <p14:creationId xmlns:p14="http://schemas.microsoft.com/office/powerpoint/2010/main" val="2163541789"/>
+        <p14:creationId xmlns:p14="http://schemas.microsoft.com/office/powerpoint/2010/main" val="3148251393"/>
       </p:ext>
     </p:extLst>
   </p:cSld>
@@ -5940,7 +5792,7 @@
                   <a:schemeClr val="bg1"/>
                 </a:solidFill>
               </a:rPr>
-              <a:t>Aprenda+</a:t>
+              <a:t>Leitura Específica</a:t>
             </a:r>
             <a:endParaRPr lang="en-US" dirty="0">
               <a:solidFill>
@@ -5964,8 +5816,8 @@
         </p:nvSpPr>
         <p:spPr>
           <a:xfrm>
-            <a:off x="382902" y="1236825"/>
-            <a:ext cx="7383853" cy="3477875"/>
+            <a:off x="382903" y="1236825"/>
+            <a:ext cx="7022608" cy="3554819"/>
           </a:xfrm>
           <a:prstGeom prst="rect">
             <a:avLst/>
@@ -6001,30 +5853,38 @@
               <a:buChar char="ü"/>
             </a:pPr>
             <a:r>
-              <a:rPr lang="pt-BR" sz="2000" b="1" dirty="0"/>
-              <a:t>Arquitetura de Computador : </a:t>
-            </a:r>
-            <a:r>
-              <a:rPr lang="pt-BR" sz="2000" dirty="0">
+              <a:rPr lang="pt-BR" sz="1500" b="1" dirty="0"/>
+              <a:t>Arquitetura de Computador – </a:t>
+            </a:r>
+            <a:r>
+              <a:rPr lang="pt-BR" sz="1500" b="1" dirty="0">
+                <a:solidFill>
+                  <a:srgbClr val="FF0000"/>
+                </a:solidFill>
+              </a:rPr>
+              <a:t>Resenha junto com o aluno</a:t>
+            </a:r>
+          </a:p>
+          <a:p>
+            <a:r>
+              <a:rPr lang="pt-BR" sz="1500" b="1" dirty="0"/>
+              <a:t> 	</a:t>
+            </a:r>
+            <a:r>
+              <a:rPr lang="pt-BR" sz="1500" dirty="0">
                 <a:hlinkClick r:id="rId2"/>
               </a:rPr>
-              <a:t>https://youtu.be/5BpgAHBZgec</a:t>
-            </a:r>
-            <a:r>
-              <a:rPr lang="pt-BR" sz="2000" dirty="0"/>
+              <a:t>https://www.icloud.com.br/5406/o-que-e-arquitetura-e-organizacao-de-computadores</a:t>
+            </a:r>
+            <a:r>
+              <a:rPr lang="pt-BR" sz="1500" dirty="0"/>
               <a:t> </a:t>
             </a:r>
           </a:p>
           <a:p>
             <a:r>
-              <a:rPr lang="pt-BR" sz="2000" dirty="0">
-                <a:hlinkClick r:id="rId3"/>
-              </a:rPr>
-              <a:t>https://youtu.be/HEjPop-aK_w</a:t>
-            </a:r>
-            <a:r>
-              <a:rPr lang="pt-BR" sz="2000" dirty="0"/>
-              <a:t> </a:t>
+              <a:rPr lang="pt-BR" sz="1500" b="1" dirty="0"/>
+              <a:t>       </a:t>
             </a:r>
           </a:p>
           <a:p>
@@ -6032,10 +5892,74 @@
               <a:buFont typeface="Wingdings" panose="05000000000000000000" pitchFamily="2" charset="2"/>
               <a:buChar char="ü"/>
             </a:pPr>
-            <a:endParaRPr lang="pt-BR" sz="2000" b="1"/>
-          </a:p>
-          <a:p>
-            <a:endParaRPr lang="pt-BR" sz="2000" b="1" dirty="0"/>
+            <a:r>
+              <a:rPr lang="pt-BR" sz="1500" b="1" dirty="0"/>
+              <a:t>Internet / Páginas Web – </a:t>
+            </a:r>
+            <a:r>
+              <a:rPr lang="pt-BR" sz="1500" b="1" dirty="0">
+                <a:solidFill>
+                  <a:srgbClr val="FF0000"/>
+                </a:solidFill>
+              </a:rPr>
+              <a:t>trazer um elemento para debate</a:t>
+            </a:r>
+            <a:endParaRPr lang="pt-BR" sz="1500" dirty="0">
+              <a:solidFill>
+                <a:srgbClr val="FF0000"/>
+              </a:solidFill>
+            </a:endParaRPr>
+          </a:p>
+          <a:p>
+            <a:r>
+              <a:rPr lang="pt-BR" sz="1500" dirty="0"/>
+              <a:t>	</a:t>
+            </a:r>
+            <a:r>
+              <a:rPr lang="pt-BR" sz="1500" dirty="0">
+                <a:hlinkClick r:id="rId3"/>
+              </a:rPr>
+              <a:t>https://www.w3schools.com/</a:t>
+            </a:r>
+            <a:r>
+              <a:rPr lang="pt-BR" sz="1500" dirty="0"/>
+              <a:t> </a:t>
+            </a:r>
+          </a:p>
+          <a:p>
+            <a:r>
+              <a:rPr lang="pt-BR" sz="1500" dirty="0"/>
+              <a:t>	</a:t>
+            </a:r>
+            <a:r>
+              <a:rPr lang="pt-BR" sz="1500" dirty="0">
+                <a:hlinkClick r:id="rId4"/>
+              </a:rPr>
+              <a:t>https://www.w3schools.com/html/</a:t>
+            </a:r>
+            <a:r>
+              <a:rPr lang="pt-BR" sz="1500" dirty="0"/>
+              <a:t> </a:t>
+            </a:r>
+          </a:p>
+          <a:p>
+            <a:r>
+              <a:rPr lang="pt-BR" sz="1500" dirty="0"/>
+              <a:t>	</a:t>
+            </a:r>
+            <a:r>
+              <a:rPr lang="pt-BR" sz="1500" dirty="0">
+                <a:hlinkClick r:id="rId5"/>
+              </a:rPr>
+              <a:t>https://www.devmedia.com.br/html-basico-codigos-html/16596</a:t>
+            </a:r>
+            <a:r>
+              <a:rPr lang="pt-BR" sz="1500" dirty="0"/>
+              <a:t> </a:t>
+            </a:r>
+          </a:p>
+          <a:p>
+            <a:endParaRPr lang="pt-BR" sz="1500" b="1" dirty="0"/>
           </a:p>
           <a:p>
             <a:pPr marL="285750" indent="-285750">
@@ -6043,73 +5967,22 @@
               <a:buChar char="ü"/>
             </a:pPr>
             <a:r>
-              <a:rPr lang="pt-BR" sz="2000" b="1" dirty="0"/>
-              <a:t>Internet / Páginas Web</a:t>
-            </a:r>
-          </a:p>
-          <a:p>
-            <a:r>
-              <a:rPr lang="pt-BR" sz="2000" b="1" dirty="0"/>
-              <a:t>	</a:t>
-            </a:r>
-            <a:r>
-              <a:rPr lang="pt-BR" sz="2000" dirty="0">
-                <a:hlinkClick r:id="rId4"/>
+              <a:rPr lang="pt-BR" sz="1500" b="1" dirty="0"/>
+              <a:t>Pensamento Computacional - </a:t>
+            </a:r>
+            <a:r>
+              <a:rPr lang="pt-BR" sz="1500" b="1" dirty="0">
+                <a:solidFill>
+                  <a:srgbClr val="FF0000"/>
+                </a:solidFill>
               </a:rPr>
-              <a:t>https://youtu.be/Z23J9ASGrgc</a:t>
-            </a:r>
-            <a:r>
-              <a:rPr lang="pt-BR" sz="2000" b="1" dirty="0"/>
-              <a:t> </a:t>
-            </a:r>
-          </a:p>
-          <a:p>
-            <a:r>
-              <a:rPr lang="pt-BR" sz="2000" b="1" dirty="0"/>
-              <a:t>	</a:t>
-            </a:r>
-          </a:p>
-          <a:p>
-            <a:endParaRPr lang="pt-BR" sz="2000" b="1" dirty="0"/>
-          </a:p>
-          <a:p>
-            <a:pPr marL="285750" indent="-285750">
-              <a:buFont typeface="Wingdings" panose="05000000000000000000" pitchFamily="2" charset="2"/>
-              <a:buChar char="ü"/>
-            </a:pPr>
-            <a:r>
-              <a:rPr lang="pt-BR" sz="2000" b="1" dirty="0"/>
-              <a:t>Pensamento Computacional</a:t>
-            </a:r>
-          </a:p>
-          <a:p>
-            <a:r>
-              <a:rPr lang="pt-BR" sz="2000" dirty="0"/>
-              <a:t>	</a:t>
-            </a:r>
-            <a:r>
-              <a:rPr lang="pt-BR" sz="2000" dirty="0">
-                <a:hlinkClick r:id="rId5"/>
-              </a:rPr>
-              <a:t>https://youtu.be/VEwRsgAG8JE</a:t>
-            </a:r>
-            <a:r>
-              <a:rPr lang="pt-BR" sz="2000" dirty="0"/>
-              <a:t> </a:t>
-            </a:r>
-          </a:p>
-          <a:p>
-            <a:r>
-              <a:rPr lang="pt-BR" sz="2000" dirty="0"/>
-              <a:t>	Vamos em frente </a:t>
-            </a:r>
-            <a:r>
-              <a:rPr lang="pt-BR" sz="2000" dirty="0" err="1"/>
-              <a:t>pq</a:t>
-            </a:r>
-            <a:r>
-              <a:rPr lang="pt-BR" sz="2000" dirty="0"/>
-              <a:t> tem muita gente na nossa frente ...</a:t>
+              <a:t>trazer um elemento para debate</a:t>
+            </a:r>
+          </a:p>
+          <a:p>
+            <a:r>
+              <a:rPr lang="pt-BR" sz="1500" dirty="0"/>
+              <a:t>	https://educadordofuturo.com.br/tecnologia-na-educacao/o-que-e-pensamento-computacional/#:~:text=O%20que%20%C3%A9%20pensamento%20computacional%3A%20a%20metodologia%20de%20solu%C3%A7%C3%A3o%20de%20problemas%20complexos&amp;text=O%20pensamento%20computacional%20%C3%A9%20uma,ser%20aplicada%20on%20e%20offline!</a:t>
             </a:r>
           </a:p>
         </p:txBody>
@@ -6117,7 +5990,7 @@
     </p:spTree>
     <p:extLst>
       <p:ext uri="{BB962C8B-B14F-4D97-AF65-F5344CB8AC3E}">
-        <p14:creationId xmlns:p14="http://schemas.microsoft.com/office/powerpoint/2010/main" val="1267991514"/>
+        <p14:creationId xmlns:p14="http://schemas.microsoft.com/office/powerpoint/2010/main" val="2163541789"/>
       </p:ext>
     </p:extLst>
   </p:cSld>
@@ -6175,20 +6048,20 @@
         </p:spPr>
         <p:txBody>
           <a:bodyPr>
-            <a:noAutofit/>
+            <a:normAutofit fontScale="90000"/>
           </a:bodyPr>
           <a:lstStyle/>
           <a:p>
             <a:pPr algn="ctr"/>
             <a:r>
-              <a:rPr lang="pt-BR" sz="3200" dirty="0">
+              <a:rPr lang="pt-BR" dirty="0">
                 <a:solidFill>
                   <a:schemeClr val="bg1"/>
                 </a:solidFill>
               </a:rPr>
-              <a:t>Dinâmica/Atividades</a:t>
-            </a:r>
-            <a:endParaRPr lang="en-US" sz="3200" dirty="0">
+              <a:t>Aprenda+</a:t>
+            </a:r>
+            <a:endParaRPr lang="en-US" dirty="0">
               <a:solidFill>
                 <a:schemeClr val="bg1"/>
               </a:solidFill>
@@ -6210,8 +6083,8 @@
         </p:nvSpPr>
         <p:spPr>
           <a:xfrm>
-            <a:off x="349035" y="1152849"/>
-            <a:ext cx="7383853" cy="3170099"/>
+            <a:off x="382902" y="1236825"/>
+            <a:ext cx="7383853" cy="3477875"/>
           </a:xfrm>
           <a:prstGeom prst="rect">
             <a:avLst/>
@@ -6242,83 +6115,120 @@
           </a:bodyPr>
           <a:lstStyle/>
           <a:p>
-            <a:pPr algn="just" eaLnBrk="0" hangingPunct="0"/>
-            <a:r>
-              <a:rPr lang="pt-BR" sz="2000" b="1" dirty="0">
-                <a:solidFill>
-                  <a:srgbClr val="FF0000"/>
-                </a:solidFill>
-              </a:rPr>
-              <a:t>1. Laboratório:</a:t>
-            </a:r>
-            <a:r>
-              <a:rPr lang="pt-BR" sz="2000" dirty="0"/>
-              <a:t> (</a:t>
-            </a:r>
-            <a:r>
-              <a:rPr lang="pt-BR" sz="2000" b="1" dirty="0"/>
-              <a:t>draw.io</a:t>
-            </a:r>
-            <a:r>
-              <a:rPr lang="pt-BR" sz="2000" dirty="0"/>
-              <a:t>)</a:t>
-            </a:r>
-          </a:p>
-          <a:p>
-            <a:pPr algn="just" eaLnBrk="0" hangingPunct="0"/>
-            <a:endParaRPr lang="pt-BR" sz="2000" dirty="0"/>
-          </a:p>
-          <a:p>
-            <a:pPr algn="just" eaLnBrk="0" hangingPunct="0"/>
-            <a:r>
-              <a:rPr lang="pt-BR" sz="2000" dirty="0"/>
-              <a:t>Desenhar a arquitetura do computador</a:t>
-            </a:r>
-          </a:p>
-          <a:p>
-            <a:pPr algn="just" eaLnBrk="0" hangingPunct="0"/>
-            <a:endParaRPr lang="pt-BR" sz="2000" dirty="0"/>
-          </a:p>
-          <a:p>
-            <a:pPr algn="just" eaLnBrk="0" hangingPunct="0"/>
-            <a:r>
-              <a:rPr lang="pt-BR" sz="2000" b="1" dirty="0">
-                <a:solidFill>
-                  <a:srgbClr val="FF0000"/>
-                </a:solidFill>
-              </a:rPr>
-              <a:t>2. Extensão:</a:t>
-            </a:r>
-          </a:p>
-          <a:p>
-            <a:pPr algn="just" eaLnBrk="0" hangingPunct="0"/>
-            <a:endParaRPr lang="pt-BR" sz="2000" dirty="0"/>
-          </a:p>
-          <a:p>
-            <a:pPr algn="just" eaLnBrk="0" hangingPunct="0"/>
-            <a:r>
-              <a:rPr lang="pt-BR" sz="2000" dirty="0"/>
-              <a:t>Podcast (Arquitetura; Internet ou Pensamento Computacional)</a:t>
-            </a:r>
-          </a:p>
-          <a:p>
-            <a:pPr marL="342900" indent="-342900" algn="just" eaLnBrk="0" hangingPunct="0">
+            <a:pPr marL="285750" indent="-285750">
               <a:buFont typeface="Wingdings" panose="05000000000000000000" pitchFamily="2" charset="2"/>
               <a:buChar char="ü"/>
             </a:pPr>
-            <a:endParaRPr lang="pt-BR" sz="2000" dirty="0"/>
-          </a:p>
-          <a:p>
-            <a:pPr algn="just" eaLnBrk="0" hangingPunct="0"/>
+            <a:r>
+              <a:rPr lang="pt-BR" sz="2000" b="1" dirty="0"/>
+              <a:t>Arquitetura de Computador : </a:t>
+            </a:r>
             <a:r>
               <a:rPr lang="pt-BR" sz="2000" dirty="0">
                 <a:hlinkClick r:id="rId2"/>
               </a:rPr>
-              <a:t>https://filmora.wondershare.com.br/dicas-edicao-audio/como-gravar-e-editar-podcast.html</a:t>
+              <a:t>https://youtu.be/5BpgAHBZgec</a:t>
             </a:r>
             <a:r>
               <a:rPr lang="pt-BR" sz="2000" dirty="0"/>
-              <a:t>? </a:t>
+              <a:t> </a:t>
+            </a:r>
+          </a:p>
+          <a:p>
+            <a:r>
+              <a:rPr lang="pt-BR" sz="2000" dirty="0">
+                <a:hlinkClick r:id="rId3"/>
+              </a:rPr>
+              <a:t>https://youtu.be/HEjPop-aK_w</a:t>
+            </a:r>
+            <a:r>
+              <a:rPr lang="pt-BR" sz="2000" dirty="0"/>
+              <a:t> </a:t>
+            </a:r>
+          </a:p>
+          <a:p>
+            <a:pPr marL="285750" indent="-285750">
+              <a:buFont typeface="Wingdings" panose="05000000000000000000" pitchFamily="2" charset="2"/>
+              <a:buChar char="ü"/>
+            </a:pPr>
+            <a:endParaRPr lang="pt-BR" sz="2000" b="1"/>
+          </a:p>
+          <a:p>
+            <a:endParaRPr lang="pt-BR" sz="2000" b="1" dirty="0"/>
+          </a:p>
+          <a:p>
+            <a:pPr marL="285750" indent="-285750">
+              <a:buFont typeface="Wingdings" panose="05000000000000000000" pitchFamily="2" charset="2"/>
+              <a:buChar char="ü"/>
+            </a:pPr>
+            <a:r>
+              <a:rPr lang="pt-BR" sz="2000" b="1" dirty="0"/>
+              <a:t>Internet / Páginas Web</a:t>
+            </a:r>
+          </a:p>
+          <a:p>
+            <a:r>
+              <a:rPr lang="pt-BR" sz="2000" b="1" dirty="0"/>
+              <a:t>	</a:t>
+            </a:r>
+            <a:r>
+              <a:rPr lang="pt-BR" sz="2000" dirty="0">
+                <a:hlinkClick r:id="rId4"/>
+              </a:rPr>
+              <a:t>https://youtu.be/Z23J9ASGrgc</a:t>
+            </a:r>
+            <a:r>
+              <a:rPr lang="pt-BR" sz="2000" b="1" dirty="0"/>
+              <a:t> </a:t>
+            </a:r>
+          </a:p>
+          <a:p>
+            <a:r>
+              <a:rPr lang="pt-BR" sz="2000" b="1" dirty="0"/>
+              <a:t>	</a:t>
+            </a:r>
+          </a:p>
+          <a:p>
+            <a:endParaRPr lang="pt-BR" sz="2000" b="1" dirty="0"/>
+          </a:p>
+          <a:p>
+            <a:pPr marL="285750" indent="-285750">
+              <a:buFont typeface="Wingdings" panose="05000000000000000000" pitchFamily="2" charset="2"/>
+              <a:buChar char="ü"/>
+            </a:pPr>
+            <a:r>
+              <a:rPr lang="pt-BR" sz="2000" b="1" dirty="0"/>
+              <a:t>Pensamento Computacional</a:t>
+            </a:r>
+          </a:p>
+          <a:p>
+            <a:r>
+              <a:rPr lang="pt-BR" sz="2000" dirty="0"/>
+              <a:t>	</a:t>
+            </a:r>
+            <a:r>
+              <a:rPr lang="pt-BR" sz="2000" dirty="0">
+                <a:hlinkClick r:id="rId5"/>
+              </a:rPr>
+              <a:t>https://youtu.be/VEwRsgAG8JE</a:t>
+            </a:r>
+            <a:r>
+              <a:rPr lang="pt-BR" sz="2000" dirty="0"/>
+              <a:t> </a:t>
+            </a:r>
+          </a:p>
+          <a:p>
+            <a:r>
+              <a:rPr lang="pt-BR" sz="2000" dirty="0"/>
+              <a:t>	Vamos em frente </a:t>
+            </a:r>
+            <a:r>
+              <a:rPr lang="pt-BR" sz="2000" dirty="0" err="1"/>
+              <a:t>pq</a:t>
+            </a:r>
+            <a:r>
+              <a:rPr lang="pt-BR" sz="2000" dirty="0"/>
+              <a:t> tem muita gente na nossa frente ...</a:t>
             </a:r>
           </a:p>
         </p:txBody>
@@ -6326,7 +6236,7 @@
     </p:spTree>
     <p:extLst>
       <p:ext uri="{BB962C8B-B14F-4D97-AF65-F5344CB8AC3E}">
-        <p14:creationId xmlns:p14="http://schemas.microsoft.com/office/powerpoint/2010/main" val="468805735"/>
+        <p14:creationId xmlns:p14="http://schemas.microsoft.com/office/powerpoint/2010/main" val="1267991514"/>
       </p:ext>
     </p:extLst>
   </p:cSld>
@@ -6384,6 +6294,215 @@
         </p:spPr>
         <p:txBody>
           <a:bodyPr>
+            <a:noAutofit/>
+          </a:bodyPr>
+          <a:lstStyle/>
+          <a:p>
+            <a:pPr algn="ctr"/>
+            <a:r>
+              <a:rPr lang="pt-BR" sz="3200" dirty="0">
+                <a:solidFill>
+                  <a:schemeClr val="bg1"/>
+                </a:solidFill>
+              </a:rPr>
+              <a:t>Dinâmica/Atividades</a:t>
+            </a:r>
+            <a:endParaRPr lang="en-US" sz="3200" dirty="0">
+              <a:solidFill>
+                <a:schemeClr val="bg1"/>
+              </a:solidFill>
+            </a:endParaRPr>
+          </a:p>
+        </p:txBody>
+      </p:sp>
+      <p:sp>
+        <p:nvSpPr>
+          <p:cNvPr id="3" name="CaixaDeTexto 2">
+            <a:extLst>
+              <a:ext uri="{FF2B5EF4-FFF2-40B4-BE49-F238E27FC236}">
+                <a16:creationId xmlns:a16="http://schemas.microsoft.com/office/drawing/2014/main" id="{376663E4-1CEE-9F31-C5DA-EFDC6BF8B1CE}"/>
+              </a:ext>
+            </a:extLst>
+          </p:cNvPr>
+          <p:cNvSpPr txBox="1"/>
+          <p:nvPr/>
+        </p:nvSpPr>
+        <p:spPr>
+          <a:xfrm>
+            <a:off x="349035" y="1152849"/>
+            <a:ext cx="7383853" cy="3170099"/>
+          </a:xfrm>
+          <a:prstGeom prst="rect">
+            <a:avLst/>
+          </a:prstGeom>
+          <a:noFill/>
+          <a:ln w="12700" cap="flat">
+            <a:noFill/>
+            <a:miter lim="400000"/>
+          </a:ln>
+          <a:effectLst/>
+          <a:sp3d/>
+        </p:spPr>
+        <p:style>
+          <a:lnRef idx="0">
+            <a:scrgbClr r="0" g="0" b="0"/>
+          </a:lnRef>
+          <a:fillRef idx="0">
+            <a:scrgbClr r="0" g="0" b="0"/>
+          </a:fillRef>
+          <a:effectRef idx="0">
+            <a:scrgbClr r="0" g="0" b="0"/>
+          </a:effectRef>
+          <a:fontRef idx="none"/>
+        </p:style>
+        <p:txBody>
+          <a:bodyPr wrap="square">
+            <a:spAutoFit/>
+          </a:bodyPr>
+          <a:lstStyle/>
+          <a:p>
+            <a:pPr algn="just" eaLnBrk="0" hangingPunct="0"/>
+            <a:r>
+              <a:rPr lang="pt-BR" sz="2000" b="1" dirty="0">
+                <a:solidFill>
+                  <a:srgbClr val="FF0000"/>
+                </a:solidFill>
+              </a:rPr>
+              <a:t>1. Laboratório:</a:t>
+            </a:r>
+            <a:r>
+              <a:rPr lang="pt-BR" sz="2000" dirty="0"/>
+              <a:t> (</a:t>
+            </a:r>
+            <a:r>
+              <a:rPr lang="pt-BR" sz="2000" b="1" dirty="0"/>
+              <a:t>draw.io</a:t>
+            </a:r>
+            <a:r>
+              <a:rPr lang="pt-BR" sz="2000" dirty="0"/>
+              <a:t>)</a:t>
+            </a:r>
+          </a:p>
+          <a:p>
+            <a:pPr algn="just" eaLnBrk="0" hangingPunct="0"/>
+            <a:endParaRPr lang="pt-BR" sz="2000" dirty="0"/>
+          </a:p>
+          <a:p>
+            <a:pPr algn="just" eaLnBrk="0" hangingPunct="0"/>
+            <a:r>
+              <a:rPr lang="pt-BR" sz="2000" dirty="0"/>
+              <a:t>Desenhar a arquitetura do computador</a:t>
+            </a:r>
+          </a:p>
+          <a:p>
+            <a:pPr algn="just" eaLnBrk="0" hangingPunct="0"/>
+            <a:endParaRPr lang="pt-BR" sz="2000" dirty="0"/>
+          </a:p>
+          <a:p>
+            <a:pPr algn="just" eaLnBrk="0" hangingPunct="0"/>
+            <a:r>
+              <a:rPr lang="pt-BR" sz="2000" b="1" dirty="0">
+                <a:solidFill>
+                  <a:srgbClr val="FF0000"/>
+                </a:solidFill>
+              </a:rPr>
+              <a:t>2. Extensão:</a:t>
+            </a:r>
+          </a:p>
+          <a:p>
+            <a:pPr algn="just" eaLnBrk="0" hangingPunct="0"/>
+            <a:endParaRPr lang="pt-BR" sz="2000" dirty="0"/>
+          </a:p>
+          <a:p>
+            <a:pPr algn="just" eaLnBrk="0" hangingPunct="0"/>
+            <a:r>
+              <a:rPr lang="pt-BR" sz="2000" dirty="0"/>
+              <a:t>Podcast (Arquitetura; Internet ou Pensamento Computacional)</a:t>
+            </a:r>
+          </a:p>
+          <a:p>
+            <a:pPr marL="342900" indent="-342900" algn="just" eaLnBrk="0" hangingPunct="0">
+              <a:buFont typeface="Wingdings" panose="05000000000000000000" pitchFamily="2" charset="2"/>
+              <a:buChar char="ü"/>
+            </a:pPr>
+            <a:endParaRPr lang="pt-BR" sz="2000" dirty="0"/>
+          </a:p>
+          <a:p>
+            <a:pPr algn="just" eaLnBrk="0" hangingPunct="0"/>
+            <a:r>
+              <a:rPr lang="pt-BR" sz="2000" dirty="0">
+                <a:hlinkClick r:id="rId2"/>
+              </a:rPr>
+              <a:t>https://filmora.wondershare.com.br/dicas-edicao-audio/como-gravar-e-editar-podcast.html</a:t>
+            </a:r>
+            <a:r>
+              <a:rPr lang="pt-BR" sz="2000" dirty="0"/>
+              <a:t>? </a:t>
+            </a:r>
+          </a:p>
+        </p:txBody>
+      </p:sp>
+    </p:spTree>
+    <p:extLst>
+      <p:ext uri="{BB962C8B-B14F-4D97-AF65-F5344CB8AC3E}">
+        <p14:creationId xmlns:p14="http://schemas.microsoft.com/office/powerpoint/2010/main" val="468805735"/>
+      </p:ext>
+    </p:extLst>
+  </p:cSld>
+  <p:clrMapOvr>
+    <a:masterClrMapping/>
+  </p:clrMapOvr>
+  <p:transition spd="med"/>
+</p:sld>
+</file>
+
+<file path=ppt/slides/slide14.xml><?xml version="1.0" encoding="utf-8"?>
+<p:sld xmlns:a="http://schemas.openxmlformats.org/drawingml/2006/main" xmlns:r="http://schemas.openxmlformats.org/officeDocument/2006/relationships" xmlns:p="http://schemas.openxmlformats.org/presentationml/2006/main">
+  <p:cSld>
+    <p:spTree>
+      <p:nvGrpSpPr>
+        <p:cNvPr id="1" name=""/>
+        <p:cNvGrpSpPr/>
+        <p:nvPr/>
+      </p:nvGrpSpPr>
+      <p:grpSpPr>
+        <a:xfrm>
+          <a:off x="0" y="0"/>
+          <a:ext cx="0" cy="0"/>
+          <a:chOff x="0" y="0"/>
+          <a:chExt cx="0" cy="0"/>
+        </a:xfrm>
+      </p:grpSpPr>
+      <p:sp>
+        <p:nvSpPr>
+          <p:cNvPr id="6" name="Título 1">
+            <a:extLst>
+              <a:ext uri="{FF2B5EF4-FFF2-40B4-BE49-F238E27FC236}">
+                <a16:creationId xmlns:a16="http://schemas.microsoft.com/office/drawing/2014/main" id="{3DF4DE9F-E280-4DD5-A63B-3C136B01E07D}"/>
+              </a:ext>
+            </a:extLst>
+          </p:cNvPr>
+          <p:cNvSpPr>
+            <a:spLocks noGrp="1"/>
+          </p:cNvSpPr>
+          <p:nvPr>
+            <p:ph type="title"/>
+          </p:nvPr>
+        </p:nvSpPr>
+        <p:spPr>
+          <a:xfrm>
+            <a:off x="1809572" y="170646"/>
+            <a:ext cx="4866887" cy="942000"/>
+          </a:xfrm>
+          <a:prstGeom prst="flowChartDocument">
+            <a:avLst/>
+          </a:prstGeom>
+          <a:solidFill>
+            <a:srgbClr val="F00E3E"/>
+          </a:solidFill>
+        </p:spPr>
+        <p:txBody>
+          <a:bodyPr>
             <a:normAutofit/>
           </a:bodyPr>
           <a:lstStyle/>
@@ -6712,7 +6831,7 @@
 </p:sld>
 </file>
 
-<file path=ppt/slides/slide14.xml><?xml version="1.0" encoding="utf-8"?>
+<file path=ppt/slides/slide15.xml><?xml version="1.0" encoding="utf-8"?>
 <p:sld xmlns:a="http://schemas.openxmlformats.org/drawingml/2006/main" xmlns:r="http://schemas.openxmlformats.org/officeDocument/2006/relationships" xmlns:p="http://schemas.openxmlformats.org/presentationml/2006/main">
   <p:cSld>
     <p:spTree>
@@ -6756,7 +6875,7 @@
           </a:ln>
           <a:extLst>
             <a:ext uri="{C572A759-6A51-4108-AA02-DFA0A04FC94B}">
-              <ma14:wrappingTextBoxFlag xmlns:ma14="http://schemas.microsoft.com/office/mac/drawingml/2011/main" xmlns="" val="1"/>
+              <ma14:wrappingTextBoxFlag xmlns="" xmlns:ma14="http://schemas.microsoft.com/office/mac/drawingml/2011/main" val="1"/>
             </a:ext>
           </a:extLst>
         </p:spPr>
@@ -7073,7 +7192,7 @@
           </a:ln>
           <a:extLst>
             <a:ext uri="{C572A759-6A51-4108-AA02-DFA0A04FC94B}">
-              <ma14:wrappingTextBoxFlag xmlns:ma14="http://schemas.microsoft.com/office/mac/drawingml/2011/main" xmlns="" val="1"/>
+              <ma14:wrappingTextBoxFlag xmlns="" xmlns:ma14="http://schemas.microsoft.com/office/mac/drawingml/2011/main" val="1"/>
             </a:ext>
           </a:extLst>
         </p:spPr>
@@ -7437,7 +7556,7 @@
           </a:ln>
           <a:extLst>
             <a:ext uri="{C572A759-6A51-4108-AA02-DFA0A04FC94B}">
-              <ma14:wrappingTextBoxFlag xmlns:ma14="http://schemas.microsoft.com/office/mac/drawingml/2011/main" xmlns="" val="1"/>
+              <ma14:wrappingTextBoxFlag xmlns="" xmlns:ma14="http://schemas.microsoft.com/office/mac/drawingml/2011/main" val="1"/>
             </a:ext>
           </a:extLst>
         </p:spPr>
@@ -7754,7 +7873,7 @@
           </a:ln>
           <a:extLst>
             <a:ext uri="{C572A759-6A51-4108-AA02-DFA0A04FC94B}">
-              <ma14:wrappingTextBoxFlag xmlns:ma14="http://schemas.microsoft.com/office/mac/drawingml/2011/main" xmlns="" val="1"/>
+              <ma14:wrappingTextBoxFlag xmlns="" xmlns:ma14="http://schemas.microsoft.com/office/mac/drawingml/2011/main" val="1"/>
             </a:ext>
           </a:extLst>
         </p:spPr>
@@ -8529,8 +8648,8 @@
         </p:nvSpPr>
         <p:spPr>
           <a:xfrm>
-            <a:off x="382903" y="1236825"/>
-            <a:ext cx="7022608" cy="3847207"/>
+            <a:off x="349037" y="1236823"/>
+            <a:ext cx="7022608" cy="3323987"/>
           </a:xfrm>
           <a:prstGeom prst="rect">
             <a:avLst/>
@@ -8566,7 +8685,23 @@
           </a:p>
           <a:p>
             <a:pPr algn="just"/>
-            <a:endParaRPr lang="pt-BR" sz="2400" dirty="0"/>
+            <a:r>
+              <a:rPr lang="pt-BR" sz="2400" dirty="0"/>
+              <a:t>1. Aprendendo a utilizar o computador</a:t>
+            </a:r>
+          </a:p>
+          <a:p>
+            <a:pPr algn="just"/>
+            <a:r>
+              <a:rPr lang="pt-BR" sz="2400" dirty="0">
+                <a:hlinkClick r:id="rId2"/>
+              </a:rPr>
+              <a:t>https://youtu.be/_pdSAN6PO6w</a:t>
+            </a:r>
+            <a:r>
+              <a:rPr lang="pt-BR" sz="2400" dirty="0"/>
+              <a:t> </a:t>
+            </a:r>
           </a:p>
           <a:p>
             <a:pPr algn="just"/>
@@ -8574,91 +8709,79 @@
           </a:p>
           <a:p>
             <a:pPr algn="just"/>
-            <a:endParaRPr lang="pt-BR" sz="2400" dirty="0"/>
-          </a:p>
-          <a:p>
-            <a:pPr algn="just"/>
-            <a:endParaRPr lang="pt-BR" sz="2400" dirty="0"/>
-          </a:p>
-          <a:p>
-            <a:pPr algn="just"/>
-            <a:endParaRPr lang="pt-BR" sz="2400" dirty="0"/>
-          </a:p>
-          <a:p>
-            <a:pPr algn="just"/>
-            <a:endParaRPr lang="pt-BR" sz="2000" dirty="0">
-              <a:hlinkClick r:id="rId2"/>
+            <a:r>
+              <a:rPr lang="pt-BR" sz="2400" dirty="0"/>
+              <a:t>2. Funcionamento do Computador  - </a:t>
+            </a:r>
+            <a:r>
+              <a:rPr lang="pt-BR" sz="2400" b="1" dirty="0">
+                <a:solidFill>
+                  <a:srgbClr val="FF0000"/>
+                </a:solidFill>
+              </a:rPr>
+              <a:t>Componentes</a:t>
+            </a:r>
+            <a:endParaRPr lang="pt-BR" sz="2000" b="1" dirty="0">
+              <a:solidFill>
+                <a:srgbClr val="FF0000"/>
+              </a:solidFill>
+              <a:hlinkClick r:id="rId3"/>
             </a:endParaRPr>
           </a:p>
           <a:p>
-            <a:pPr algn="just"/>
-            <a:endParaRPr lang="pt-BR" sz="2000" dirty="0">
-              <a:hlinkClick r:id="rId2"/>
-            </a:endParaRPr>
-          </a:p>
-          <a:p>
-            <a:pPr algn="just"/>
-            <a:endParaRPr lang="pt-BR" sz="2000" dirty="0">
-              <a:hlinkClick r:id="rId2"/>
-            </a:endParaRPr>
-          </a:p>
-          <a:p>
-            <a:pPr algn="just"/>
-            <a:endParaRPr lang="pt-BR" sz="2000" dirty="0">
-              <a:hlinkClick r:id="rId2"/>
-            </a:endParaRPr>
-          </a:p>
-          <a:p>
-            <a:pPr lvl="1" algn="just"/>
-            <a:r>
-              <a:rPr lang="pt-BR" sz="2000" dirty="0">
-                <a:hlinkClick r:id="rId2"/>
+            <a:pPr lvl="1" indent="0" algn="just"/>
+            <a:r>
+              <a:rPr lang="pt-BR" sz="2400" dirty="0">
+                <a:hlinkClick r:id="rId3"/>
               </a:rPr>
               <a:t>https://youtu.be/RRBO9KYuN28</a:t>
             </a:r>
             <a:r>
-              <a:rPr lang="pt-BR" sz="2000" dirty="0"/>
-              <a:t> </a:t>
+              <a:rPr lang="pt-BR" sz="2400" dirty="0"/>
+              <a:t>  	</a:t>
+            </a:r>
+          </a:p>
+          <a:p>
+            <a:pPr lvl="1" algn="just"/>
+            <a:endParaRPr lang="pt-BR" dirty="0">
+              <a:hlinkClick r:id="rId4"/>
+            </a:endParaRPr>
+          </a:p>
+          <a:p>
+            <a:pPr lvl="1" indent="0" algn="just"/>
+            <a:r>
+              <a:rPr lang="pt-BR" sz="2400" dirty="0"/>
+              <a:t>3. Componentes do Computador </a:t>
+            </a:r>
+            <a:r>
+              <a:rPr lang="pt-BR" sz="2400"/>
+              <a:t>- Parte 2</a:t>
+            </a:r>
+            <a:endParaRPr lang="pt-BR" sz="2400" dirty="0">
+              <a:hlinkClick r:id="rId3">
+                <a:extLst>
+                  <a:ext uri="{A12FA001-AC4F-418D-AE19-62706E023703}">
+                    <ahyp:hlinkClr xmlns:ahyp="http://schemas.microsoft.com/office/drawing/2018/hyperlinkcolor" val="tx"/>
+                  </a:ext>
+                </a:extLst>
+              </a:hlinkClick>
+            </a:endParaRPr>
+          </a:p>
+          <a:p>
+            <a:pPr lvl="1" indent="0" algn="just"/>
+            <a:r>
+              <a:rPr lang="pt-BR" sz="2400" dirty="0">
+                <a:hlinkClick r:id="rId4"/>
+              </a:rPr>
+              <a:t>https://youtu.be/HB4I2CgkcCo</a:t>
+            </a:r>
+            <a:r>
+              <a:rPr lang="pt-BR" sz="2400" dirty="0"/>
+              <a:t>  </a:t>
             </a:r>
           </a:p>
         </p:txBody>
       </p:sp>
-      <p:pic>
-        <p:nvPicPr>
-          <p:cNvPr id="4" name="Imagem 3" descr="Diagrama&#10;&#10;Descrição gerada automaticamente">
-            <a:extLst>
-              <a:ext uri="{FF2B5EF4-FFF2-40B4-BE49-F238E27FC236}">
-                <a16:creationId xmlns:a16="http://schemas.microsoft.com/office/drawing/2014/main" id="{3009A212-ACBC-E461-41C3-5A6530D7CD3A}"/>
-              </a:ext>
-            </a:extLst>
-          </p:cNvPr>
-          <p:cNvPicPr>
-            <a:picLocks noChangeAspect="1"/>
-          </p:cNvPicPr>
-          <p:nvPr/>
-        </p:nvPicPr>
-        <p:blipFill>
-          <a:blip r:embed="rId3">
-            <a:extLst>
-              <a:ext uri="{28A0092B-C50C-407E-A947-70E740481C1C}">
-                <a14:useLocalDpi xmlns:a14="http://schemas.microsoft.com/office/drawing/2010/main" val="0"/>
-              </a:ext>
-            </a:extLst>
-          </a:blip>
-          <a:stretch>
-            <a:fillRect/>
-          </a:stretch>
-        </p:blipFill>
-        <p:spPr>
-          <a:xfrm>
-            <a:off x="883354" y="1236823"/>
-            <a:ext cx="6402780" cy="3425487"/>
-          </a:xfrm>
-          <a:prstGeom prst="rect">
-            <a:avLst/>
-          </a:prstGeom>
-        </p:spPr>
-      </p:pic>
     </p:spTree>
     <p:extLst>
       <p:ext uri="{BB962C8B-B14F-4D97-AF65-F5344CB8AC3E}">
@@ -8720,20 +8843,20 @@
         </p:spPr>
         <p:txBody>
           <a:bodyPr>
-            <a:normAutofit fontScale="90000"/>
+            <a:normAutofit/>
           </a:bodyPr>
           <a:lstStyle/>
           <a:p>
             <a:pPr algn="ctr"/>
             <a:r>
-              <a:rPr lang="pt-BR" dirty="0">
+              <a:rPr lang="pt-BR" sz="3200" dirty="0">
                 <a:solidFill>
                   <a:schemeClr val="bg1"/>
                 </a:solidFill>
               </a:rPr>
-              <a:t>Internet</a:t>
-            </a:r>
-            <a:endParaRPr lang="en-US" dirty="0">
+              <a:t>Arquitetura do Computador</a:t>
+            </a:r>
+            <a:endParaRPr lang="en-US" sz="3200" dirty="0">
               <a:solidFill>
                 <a:schemeClr val="bg1"/>
               </a:solidFill>
@@ -8755,8 +8878,8 @@
         </p:nvSpPr>
         <p:spPr>
           <a:xfrm>
-            <a:off x="382903" y="1180380"/>
-            <a:ext cx="7022608" cy="461665"/>
+            <a:off x="349037" y="1236823"/>
+            <a:ext cx="7022608" cy="3847207"/>
           </a:xfrm>
           <a:prstGeom prst="rect">
             <a:avLst/>
@@ -8787,36 +8910,84 @@
           </a:bodyPr>
           <a:lstStyle/>
           <a:p>
-            <a:r>
-              <a:rPr lang="pt-BR" sz="2400" b="1" dirty="0" err="1">
-                <a:solidFill>
-                  <a:srgbClr val="FF0000"/>
-                </a:solidFill>
+            <a:pPr algn="just"/>
+            <a:endParaRPr lang="pt-BR" sz="2400" dirty="0"/>
+          </a:p>
+          <a:p>
+            <a:pPr algn="just"/>
+            <a:endParaRPr lang="pt-BR" sz="2400" dirty="0"/>
+          </a:p>
+          <a:p>
+            <a:pPr algn="just"/>
+            <a:endParaRPr lang="pt-BR" sz="2400" dirty="0"/>
+          </a:p>
+          <a:p>
+            <a:pPr algn="just"/>
+            <a:endParaRPr lang="pt-BR" sz="2400" dirty="0"/>
+          </a:p>
+          <a:p>
+            <a:pPr algn="just"/>
+            <a:endParaRPr lang="pt-BR" sz="2400" dirty="0"/>
+          </a:p>
+          <a:p>
+            <a:pPr algn="just"/>
+            <a:endParaRPr lang="pt-BR" sz="2400" dirty="0"/>
+          </a:p>
+          <a:p>
+            <a:pPr algn="just"/>
+            <a:endParaRPr lang="pt-BR" sz="2000" dirty="0">
+              <a:hlinkClick r:id="rId2"/>
+            </a:endParaRPr>
+          </a:p>
+          <a:p>
+            <a:pPr algn="just"/>
+            <a:endParaRPr lang="pt-BR" sz="2000" dirty="0">
+              <a:hlinkClick r:id="rId2"/>
+            </a:endParaRPr>
+          </a:p>
+          <a:p>
+            <a:pPr algn="just"/>
+            <a:endParaRPr lang="pt-BR" sz="2000" dirty="0">
+              <a:hlinkClick r:id="rId2"/>
+            </a:endParaRPr>
+          </a:p>
+          <a:p>
+            <a:pPr algn="just"/>
+            <a:endParaRPr lang="pt-BR" sz="2000" dirty="0">
+              <a:hlinkClick r:id="rId2"/>
+            </a:endParaRPr>
+          </a:p>
+          <a:p>
+            <a:pPr lvl="1" algn="just"/>
+            <a:r>
+              <a:rPr lang="pt-BR" dirty="0">
+                <a:hlinkClick r:id="rId2"/>
               </a:rPr>
-              <a:t>www</a:t>
-            </a:r>
-            <a:r>
-              <a:rPr lang="pt-BR" sz="2400" b="1" dirty="0">
-                <a:solidFill>
-                  <a:srgbClr val="FF0000"/>
-                </a:solidFill>
+              <a:t>https://youtu.be/RRBO9KYuN28</a:t>
+            </a:r>
+            <a:r>
+              <a:rPr lang="pt-BR" dirty="0"/>
+              <a:t>	</a:t>
+            </a:r>
+            <a:r>
+              <a:rPr lang="pt-BR" dirty="0">
+                <a:hlinkClick r:id="rId3"/>
               </a:rPr>
-              <a:t>; protocolos; serviços; HTML/CSS/JS</a:t>
-            </a:r>
-            <a:endParaRPr lang="pt-BR" sz="2400" dirty="0">
-              <a:solidFill>
-                <a:srgbClr val="FF0000"/>
-              </a:solidFill>
-            </a:endParaRPr>
+              <a:t>https://youtu.be/HB4I2CgkcCo</a:t>
+            </a:r>
+            <a:r>
+              <a:rPr lang="pt-BR" dirty="0"/>
+              <a:t>  </a:t>
+            </a:r>
           </a:p>
         </p:txBody>
       </p:sp>
       <p:pic>
         <p:nvPicPr>
-          <p:cNvPr id="7" name="Imagem 6" descr="Diagrama&#10;&#10;Descrição gerada automaticamente">
+          <p:cNvPr id="4" name="Imagem 3" descr="Diagrama&#10;&#10;Descrição gerada automaticamente">
             <a:extLst>
               <a:ext uri="{FF2B5EF4-FFF2-40B4-BE49-F238E27FC236}">
-                <a16:creationId xmlns:a16="http://schemas.microsoft.com/office/drawing/2014/main" id="{3D15CDE3-905A-6FAC-87AC-F612378D2174}"/>
+                <a16:creationId xmlns:a16="http://schemas.microsoft.com/office/drawing/2014/main" id="{3009A212-ACBC-E461-41C3-5A6530D7CD3A}"/>
               </a:ext>
             </a:extLst>
           </p:cNvPr>
@@ -8826,7 +8997,7 @@
           <p:nvPr/>
         </p:nvPicPr>
         <p:blipFill>
-          <a:blip r:embed="rId2">
+          <a:blip r:embed="rId4">
             <a:extLst>
               <a:ext uri="{28A0092B-C50C-407E-A947-70E740481C1C}">
                 <a14:useLocalDpi xmlns:a14="http://schemas.microsoft.com/office/drawing/2010/main" val="0"/>
@@ -8839,8 +9010,8 @@
         </p:blipFill>
         <p:spPr>
           <a:xfrm>
-            <a:off x="1351385" y="1678513"/>
-            <a:ext cx="5455816" cy="3409886"/>
+            <a:off x="883354" y="1236823"/>
+            <a:ext cx="6402780" cy="3425487"/>
           </a:xfrm>
           <a:prstGeom prst="rect">
             <a:avLst/>
@@ -8850,7 +9021,7 @@
     </p:spTree>
     <p:extLst>
       <p:ext uri="{BB962C8B-B14F-4D97-AF65-F5344CB8AC3E}">
-        <p14:creationId xmlns:p14="http://schemas.microsoft.com/office/powerpoint/2010/main" val="440528848"/>
+        <p14:creationId xmlns:p14="http://schemas.microsoft.com/office/powerpoint/2010/main" val="1523313312"/>
       </p:ext>
     </p:extLst>
   </p:cSld>
@@ -8929,12 +9100,82 @@
           </a:p>
         </p:txBody>
       </p:sp>
+      <p:sp>
+        <p:nvSpPr>
+          <p:cNvPr id="3" name="CaixaDeTexto 2">
+            <a:extLst>
+              <a:ext uri="{FF2B5EF4-FFF2-40B4-BE49-F238E27FC236}">
+                <a16:creationId xmlns:a16="http://schemas.microsoft.com/office/drawing/2014/main" id="{376663E4-1CEE-9F31-C5DA-EFDC6BF8B1CE}"/>
+              </a:ext>
+            </a:extLst>
+          </p:cNvPr>
+          <p:cNvSpPr txBox="1"/>
+          <p:nvPr/>
+        </p:nvSpPr>
+        <p:spPr>
+          <a:xfrm>
+            <a:off x="382903" y="1180380"/>
+            <a:ext cx="7022608" cy="461665"/>
+          </a:xfrm>
+          <a:prstGeom prst="rect">
+            <a:avLst/>
+          </a:prstGeom>
+          <a:noFill/>
+          <a:ln w="12700" cap="flat">
+            <a:noFill/>
+            <a:miter lim="400000"/>
+          </a:ln>
+          <a:effectLst/>
+          <a:sp3d/>
+        </p:spPr>
+        <p:style>
+          <a:lnRef idx="0">
+            <a:scrgbClr r="0" g="0" b="0"/>
+          </a:lnRef>
+          <a:fillRef idx="0">
+            <a:scrgbClr r="0" g="0" b="0"/>
+          </a:fillRef>
+          <a:effectRef idx="0">
+            <a:scrgbClr r="0" g="0" b="0"/>
+          </a:effectRef>
+          <a:fontRef idx="none"/>
+        </p:style>
+        <p:txBody>
+          <a:bodyPr wrap="square">
+            <a:spAutoFit/>
+          </a:bodyPr>
+          <a:lstStyle/>
+          <a:p>
+            <a:r>
+              <a:rPr lang="pt-BR" sz="2400" b="1" dirty="0" err="1">
+                <a:solidFill>
+                  <a:srgbClr val="FF0000"/>
+                </a:solidFill>
+              </a:rPr>
+              <a:t>www</a:t>
+            </a:r>
+            <a:r>
+              <a:rPr lang="pt-BR" sz="2400" b="1" dirty="0">
+                <a:solidFill>
+                  <a:srgbClr val="FF0000"/>
+                </a:solidFill>
+              </a:rPr>
+              <a:t>; protocolos; serviços; HTML/CSS/JS</a:t>
+            </a:r>
+            <a:endParaRPr lang="pt-BR" sz="2400" dirty="0">
+              <a:solidFill>
+                <a:srgbClr val="FF0000"/>
+              </a:solidFill>
+            </a:endParaRPr>
+          </a:p>
+        </p:txBody>
+      </p:sp>
       <p:pic>
         <p:nvPicPr>
-          <p:cNvPr id="4" name="Imagem 3">
+          <p:cNvPr id="7" name="Imagem 6" descr="Diagrama&#10;&#10;Descrição gerada automaticamente">
             <a:extLst>
               <a:ext uri="{FF2B5EF4-FFF2-40B4-BE49-F238E27FC236}">
-                <a16:creationId xmlns:a16="http://schemas.microsoft.com/office/drawing/2014/main" id="{52F386D1-1159-9BA3-9881-B16AC9D98786}"/>
+                <a16:creationId xmlns:a16="http://schemas.microsoft.com/office/drawing/2014/main" id="{3D15CDE3-905A-6FAC-87AC-F612378D2174}"/>
               </a:ext>
             </a:extLst>
           </p:cNvPr>
@@ -8944,15 +9185,21 @@
           <p:nvPr/>
         </p:nvPicPr>
         <p:blipFill>
-          <a:blip r:embed="rId2"/>
+          <a:blip r:embed="rId2">
+            <a:extLst>
+              <a:ext uri="{28A0092B-C50C-407E-A947-70E740481C1C}">
+                <a14:useLocalDpi xmlns:a14="http://schemas.microsoft.com/office/drawing/2010/main" val="0"/>
+              </a:ext>
+            </a:extLst>
+          </a:blip>
           <a:stretch>
             <a:fillRect/>
           </a:stretch>
         </p:blipFill>
         <p:spPr>
           <a:xfrm>
-            <a:off x="302956" y="1112646"/>
-            <a:ext cx="7330849" cy="3944776"/>
+            <a:off x="1351385" y="1678513"/>
+            <a:ext cx="5455816" cy="3409886"/>
           </a:xfrm>
           <a:prstGeom prst="rect">
             <a:avLst/>
@@ -8962,7 +9209,7 @@
     </p:spTree>
     <p:extLst>
       <p:ext uri="{BB962C8B-B14F-4D97-AF65-F5344CB8AC3E}">
-        <p14:creationId xmlns:p14="http://schemas.microsoft.com/office/powerpoint/2010/main" val="1405983178"/>
+        <p14:creationId xmlns:p14="http://schemas.microsoft.com/office/powerpoint/2010/main" val="440528848"/>
       </p:ext>
     </p:extLst>
   </p:cSld>
@@ -9020,20 +9267,20 @@
         </p:spPr>
         <p:txBody>
           <a:bodyPr>
-            <a:noAutofit/>
+            <a:normAutofit fontScale="90000"/>
           </a:bodyPr>
           <a:lstStyle/>
           <a:p>
             <a:pPr algn="ctr"/>
             <a:r>
-              <a:rPr lang="pt-BR" sz="3200" dirty="0">
+              <a:rPr lang="pt-BR" dirty="0">
                 <a:solidFill>
                   <a:schemeClr val="bg1"/>
                 </a:solidFill>
               </a:rPr>
-              <a:t>Pensamento Computacional</a:t>
-            </a:r>
-            <a:endParaRPr lang="en-US" sz="3200" dirty="0">
+              <a:t>Internet</a:t>
+            </a:r>
+            <a:endParaRPr lang="en-US" dirty="0">
               <a:solidFill>
                 <a:schemeClr val="bg1"/>
               </a:solidFill>
@@ -9041,81 +9288,12 @@
           </a:p>
         </p:txBody>
       </p:sp>
-      <p:sp>
-        <p:nvSpPr>
-          <p:cNvPr id="3" name="CaixaDeTexto 2">
+      <p:pic>
+        <p:nvPicPr>
+          <p:cNvPr id="4" name="Imagem 3">
             <a:extLst>
               <a:ext uri="{FF2B5EF4-FFF2-40B4-BE49-F238E27FC236}">
-                <a16:creationId xmlns:a16="http://schemas.microsoft.com/office/drawing/2014/main" id="{376663E4-1CEE-9F31-C5DA-EFDC6BF8B1CE}"/>
-              </a:ext>
-            </a:extLst>
-          </p:cNvPr>
-          <p:cNvSpPr txBox="1"/>
-          <p:nvPr/>
-        </p:nvSpPr>
-        <p:spPr>
-          <a:xfrm>
-            <a:off x="382903" y="1202958"/>
-            <a:ext cx="7022608" cy="400110"/>
-          </a:xfrm>
-          <a:prstGeom prst="rect">
-            <a:avLst/>
-          </a:prstGeom>
-          <a:noFill/>
-          <a:ln w="12700" cap="flat">
-            <a:noFill/>
-            <a:miter lim="400000"/>
-          </a:ln>
-          <a:effectLst/>
-          <a:sp3d/>
-        </p:spPr>
-        <p:style>
-          <a:lnRef idx="0">
-            <a:scrgbClr r="0" g="0" b="0"/>
-          </a:lnRef>
-          <a:fillRef idx="0">
-            <a:scrgbClr r="0" g="0" b="0"/>
-          </a:fillRef>
-          <a:effectRef idx="0">
-            <a:scrgbClr r="0" g="0" b="0"/>
-          </a:effectRef>
-          <a:fontRef idx="none"/>
-        </p:style>
-        <p:txBody>
-          <a:bodyPr wrap="square">
-            <a:spAutoFit/>
-          </a:bodyPr>
-          <a:lstStyle/>
-          <a:p>
-            <a:r>
-              <a:rPr lang="pt-BR" sz="2000" b="1" dirty="0"/>
-              <a:t>Ações</a:t>
-            </a:r>
-            <a:r>
-              <a:rPr lang="pt-BR" sz="2000" dirty="0"/>
-              <a:t> – parte programada no computador, </a:t>
-            </a:r>
-            <a:r>
-              <a:rPr lang="pt-BR" sz="2000" b="1" dirty="0">
-                <a:solidFill>
-                  <a:srgbClr val="FF0000"/>
-                </a:solidFill>
-              </a:rPr>
-              <a:t>software</a:t>
-            </a:r>
-            <a:r>
-              <a:rPr lang="pt-BR" sz="2000" dirty="0"/>
-              <a:t>.</a:t>
-            </a:r>
-          </a:p>
-        </p:txBody>
-      </p:sp>
-      <p:pic>
-        <p:nvPicPr>
-          <p:cNvPr id="7" name="Imagem 6" descr="Diagrama&#10;&#10;Descrição gerada automaticamente">
-            <a:extLst>
-              <a:ext uri="{FF2B5EF4-FFF2-40B4-BE49-F238E27FC236}">
-                <a16:creationId xmlns:a16="http://schemas.microsoft.com/office/drawing/2014/main" id="{D497AF36-0F39-F202-B9E5-C7C3828D40B9}"/>
+                <a16:creationId xmlns:a16="http://schemas.microsoft.com/office/drawing/2014/main" id="{52F386D1-1159-9BA3-9881-B16AC9D98786}"/>
               </a:ext>
             </a:extLst>
           </p:cNvPr>
@@ -9125,21 +9303,15 @@
           <p:nvPr/>
         </p:nvPicPr>
         <p:blipFill>
-          <a:blip r:embed="rId2" cstate="print">
-            <a:extLst>
-              <a:ext uri="{28A0092B-C50C-407E-A947-70E740481C1C}">
-                <a14:useLocalDpi xmlns:a14="http://schemas.microsoft.com/office/drawing/2010/main" val="0"/>
-              </a:ext>
-            </a:extLst>
-          </a:blip>
+          <a:blip r:embed="rId2"/>
           <a:stretch>
             <a:fillRect/>
           </a:stretch>
         </p:blipFill>
         <p:spPr>
           <a:xfrm>
-            <a:off x="1121340" y="1648179"/>
-            <a:ext cx="6108272" cy="3435903"/>
+            <a:off x="302956" y="1112646"/>
+            <a:ext cx="7330849" cy="3944776"/>
           </a:xfrm>
           <a:prstGeom prst="rect">
             <a:avLst/>
@@ -9149,7 +9321,7 @@
     </p:spTree>
     <p:extLst>
       <p:ext uri="{BB962C8B-B14F-4D97-AF65-F5344CB8AC3E}">
-        <p14:creationId xmlns:p14="http://schemas.microsoft.com/office/powerpoint/2010/main" val="2299541818"/>
+        <p14:creationId xmlns:p14="http://schemas.microsoft.com/office/powerpoint/2010/main" val="1405983178"/>
       </p:ext>
     </p:extLst>
   </p:cSld>
@@ -9228,12 +9400,81 @@
           </a:p>
         </p:txBody>
       </p:sp>
+      <p:sp>
+        <p:nvSpPr>
+          <p:cNvPr id="3" name="CaixaDeTexto 2">
+            <a:extLst>
+              <a:ext uri="{FF2B5EF4-FFF2-40B4-BE49-F238E27FC236}">
+                <a16:creationId xmlns:a16="http://schemas.microsoft.com/office/drawing/2014/main" id="{376663E4-1CEE-9F31-C5DA-EFDC6BF8B1CE}"/>
+              </a:ext>
+            </a:extLst>
+          </p:cNvPr>
+          <p:cNvSpPr txBox="1"/>
+          <p:nvPr/>
+        </p:nvSpPr>
+        <p:spPr>
+          <a:xfrm>
+            <a:off x="382903" y="1202958"/>
+            <a:ext cx="7022608" cy="400110"/>
+          </a:xfrm>
+          <a:prstGeom prst="rect">
+            <a:avLst/>
+          </a:prstGeom>
+          <a:noFill/>
+          <a:ln w="12700" cap="flat">
+            <a:noFill/>
+            <a:miter lim="400000"/>
+          </a:ln>
+          <a:effectLst/>
+          <a:sp3d/>
+        </p:spPr>
+        <p:style>
+          <a:lnRef idx="0">
+            <a:scrgbClr r="0" g="0" b="0"/>
+          </a:lnRef>
+          <a:fillRef idx="0">
+            <a:scrgbClr r="0" g="0" b="0"/>
+          </a:fillRef>
+          <a:effectRef idx="0">
+            <a:scrgbClr r="0" g="0" b="0"/>
+          </a:effectRef>
+          <a:fontRef idx="none"/>
+        </p:style>
+        <p:txBody>
+          <a:bodyPr wrap="square">
+            <a:spAutoFit/>
+          </a:bodyPr>
+          <a:lstStyle/>
+          <a:p>
+            <a:r>
+              <a:rPr lang="pt-BR" sz="2000" b="1" dirty="0"/>
+              <a:t>Ações</a:t>
+            </a:r>
+            <a:r>
+              <a:rPr lang="pt-BR" sz="2000" dirty="0"/>
+              <a:t> – parte programada no computador, </a:t>
+            </a:r>
+            <a:r>
+              <a:rPr lang="pt-BR" sz="2000" b="1" dirty="0">
+                <a:solidFill>
+                  <a:srgbClr val="FF0000"/>
+                </a:solidFill>
+              </a:rPr>
+              <a:t>software</a:t>
+            </a:r>
+            <a:r>
+              <a:rPr lang="pt-BR" sz="2000" dirty="0"/>
+              <a:t>.</a:t>
+            </a:r>
+          </a:p>
+        </p:txBody>
+      </p:sp>
       <p:pic>
         <p:nvPicPr>
-          <p:cNvPr id="9" name="Imagem 8" descr="Texto branco sobre fundo preto&#10;&#10;Descrição gerada automaticamente com confiança média">
+          <p:cNvPr id="7" name="Imagem 6" descr="Diagrama&#10;&#10;Descrição gerada automaticamente">
             <a:extLst>
               <a:ext uri="{FF2B5EF4-FFF2-40B4-BE49-F238E27FC236}">
-                <a16:creationId xmlns:a16="http://schemas.microsoft.com/office/drawing/2014/main" id="{44F02E65-E2B3-764A-693D-E421EF938EAC}"/>
+                <a16:creationId xmlns:a16="http://schemas.microsoft.com/office/drawing/2014/main" id="{D497AF36-0F39-F202-B9E5-C7C3828D40B9}"/>
               </a:ext>
             </a:extLst>
           </p:cNvPr>
@@ -9243,7 +9484,7 @@
           <p:nvPr/>
         </p:nvPicPr>
         <p:blipFill>
-          <a:blip r:embed="rId2">
+          <a:blip r:embed="rId2" cstate="print">
             <a:extLst>
               <a:ext uri="{28A0092B-C50C-407E-A947-70E740481C1C}">
                 <a14:useLocalDpi xmlns:a14="http://schemas.microsoft.com/office/drawing/2010/main" val="0"/>
@@ -9256,8 +9497,8 @@
         </p:blipFill>
         <p:spPr>
           <a:xfrm>
-            <a:off x="514859" y="1158867"/>
-            <a:ext cx="7401902" cy="3950766"/>
+            <a:off x="1121340" y="1648179"/>
+            <a:ext cx="6108272" cy="3435903"/>
           </a:xfrm>
           <a:prstGeom prst="rect">
             <a:avLst/>
@@ -9267,7 +9508,7 @@
     </p:spTree>
     <p:extLst>
       <p:ext uri="{BB962C8B-B14F-4D97-AF65-F5344CB8AC3E}">
-        <p14:creationId xmlns:p14="http://schemas.microsoft.com/office/powerpoint/2010/main" val="3148251393"/>
+        <p14:creationId xmlns:p14="http://schemas.microsoft.com/office/powerpoint/2010/main" val="2299541818"/>
       </p:ext>
     </p:extLst>
   </p:cSld>
@@ -11485,12 +11726,9 @@
 </file>
 
 <file path=customXml/item1.xml><?xml version="1.0" encoding="utf-8"?>
-<?mso-contentType ?>
-<FormTemplates xmlns="http://schemas.microsoft.com/sharepoint/v3/contenttype/forms">
-  <Display>DocumentLibraryForm</Display>
-  <Edit>DocumentLibraryForm</Edit>
-  <New>DocumentLibraryForm</New>
-</FormTemplates>
+<p:properties xmlns:p="http://schemas.microsoft.com/office/2006/metadata/properties" xmlns:xsi="http://www.w3.org/2001/XMLSchema-instance" xmlns:pc="http://schemas.microsoft.com/office/infopath/2007/PartnerControls">
+  <documentManagement/>
+</p:properties>
 </file>
 
 <file path=customXml/item2.xml><?xml version="1.0" encoding="utf-8"?>
@@ -11717,15 +11955,19 @@
 </file>
 
 <file path=customXml/item3.xml><?xml version="1.0" encoding="utf-8"?>
-<p:properties xmlns:p="http://schemas.microsoft.com/office/2006/metadata/properties" xmlns:xsi="http://www.w3.org/2001/XMLSchema-instance" xmlns:pc="http://schemas.microsoft.com/office/infopath/2007/PartnerControls">
-  <documentManagement/>
-</p:properties>
+<?mso-contentType ?>
+<FormTemplates xmlns="http://schemas.microsoft.com/sharepoint/v3/contenttype/forms">
+  <Display>DocumentLibraryForm</Display>
+  <Edit>DocumentLibraryForm</Edit>
+  <New>DocumentLibraryForm</New>
+</FormTemplates>
 </file>
 
 <file path=customXml/itemProps1.xml><?xml version="1.0" encoding="utf-8"?>
-<ds:datastoreItem xmlns:ds="http://schemas.openxmlformats.org/officeDocument/2006/customXml" ds:itemID="{AED456AD-07D2-43E3-AD57-2C9049066662}">
+<ds:datastoreItem xmlns:ds="http://schemas.openxmlformats.org/officeDocument/2006/customXml" ds:itemID="{961A30F4-F1EA-4F98-A164-76D337EE5565}">
   <ds:schemaRefs>
-    <ds:schemaRef ds:uri="http://schemas.microsoft.com/sharepoint/v3/contenttype/forms"/>
+    <ds:schemaRef ds:uri="http://schemas.microsoft.com/office/2006/metadata/properties"/>
+    <ds:schemaRef ds:uri="http://schemas.microsoft.com/office/infopath/2007/PartnerControls"/>
   </ds:schemaRefs>
 </ds:datastoreItem>
 </file>
@@ -11750,10 +11992,9 @@
 </file>
 
 <file path=customXml/itemProps3.xml><?xml version="1.0" encoding="utf-8"?>
-<ds:datastoreItem xmlns:ds="http://schemas.openxmlformats.org/officeDocument/2006/customXml" ds:itemID="{961A30F4-F1EA-4F98-A164-76D337EE5565}">
+<ds:datastoreItem xmlns:ds="http://schemas.openxmlformats.org/officeDocument/2006/customXml" ds:itemID="{AED456AD-07D2-43E3-AD57-2C9049066662}">
   <ds:schemaRefs>
-    <ds:schemaRef ds:uri="http://schemas.microsoft.com/office/2006/metadata/properties"/>
-    <ds:schemaRef ds:uri="http://schemas.microsoft.com/office/infopath/2007/PartnerControls"/>
+    <ds:schemaRef ds:uri="http://schemas.microsoft.com/sharepoint/v3/contenttype/forms"/>
   </ds:schemaRefs>
 </ds:datastoreItem>
 </file>
</xml_diff>